<commit_message>
Updated presentation with new result.
</commit_message>
<xml_diff>
--- a/Demo/NetSec.pptx
+++ b/Demo/NetSec.pptx
@@ -127,6 +127,22 @@
       </a:defRPr>
     </a:lvl9pPr>
   </p:defaultTextStyle>
+  <p:extLst>
+    <p:ext uri="{EFAFB233-063F-42B5-8137-9DF3F51BA10A}">
+      <p15:sldGuideLst xmlns:p15="http://schemas.microsoft.com/office/powerpoint/2012/main">
+        <p15:guide id="1" orient="horz" pos="2160">
+          <p15:clr>
+            <a:srgbClr val="A4A3A4"/>
+          </p15:clr>
+        </p15:guide>
+        <p15:guide id="2" pos="2880">
+          <p15:clr>
+            <a:srgbClr val="A4A3A4"/>
+          </p15:clr>
+        </p15:guide>
+      </p15:sldGuideLst>
+    </p:ext>
+  </p:extLst>
 </p:presentation>
 </file>
 
@@ -213,7 +229,7 @@
             <a:fld id="{9BB7F419-EE15-46A2-A207-08F5C678F910}" type="datetimeFigureOut">
               <a:rPr lang="en-US" smtClean="0"/>
               <a:pPr/>
-              <a:t>12/6/2015</a:t>
+              <a:t>12/7/2015</a:t>
             </a:fld>
             <a:endParaRPr lang="en-US"/>
           </a:p>
@@ -382,6 +398,11 @@
         </p:txBody>
       </p:sp>
     </p:spTree>
+    <p:extLst>
+      <p:ext uri="{BB962C8B-B14F-4D97-AF65-F5344CB8AC3E}">
+        <p14:creationId xmlns:p14="http://schemas.microsoft.com/office/powerpoint/2010/main" val="1515861007"/>
+      </p:ext>
+    </p:extLst>
   </p:cSld>
   <p:clrMap bg1="lt1" tx1="dk1" bg2="lt2" tx2="dk2" accent1="accent1" accent2="accent2" accent3="accent3" accent4="accent4" accent5="accent5" accent6="accent6" hlink="hlink" folHlink="folHlink"/>
   <p:notesStyle>
@@ -564,6 +585,11 @@
         </p:txBody>
       </p:sp>
     </p:spTree>
+    <p:extLst>
+      <p:ext uri="{BB962C8B-B14F-4D97-AF65-F5344CB8AC3E}">
+        <p14:creationId xmlns:p14="http://schemas.microsoft.com/office/powerpoint/2010/main" val="2508829076"/>
+      </p:ext>
+    </p:extLst>
   </p:cSld>
   <p:clrMapOvr>
     <a:masterClrMapping/>
@@ -646,6 +672,11 @@
         </p:txBody>
       </p:sp>
     </p:spTree>
+    <p:extLst>
+      <p:ext uri="{BB962C8B-B14F-4D97-AF65-F5344CB8AC3E}">
+        <p14:creationId xmlns:p14="http://schemas.microsoft.com/office/powerpoint/2010/main" val="1259116249"/>
+      </p:ext>
+    </p:extLst>
   </p:cSld>
   <p:clrMapOvr>
     <a:masterClrMapping/>
@@ -732,6 +763,11 @@
         </p:txBody>
       </p:sp>
     </p:spTree>
+    <p:extLst>
+      <p:ext uri="{BB962C8B-B14F-4D97-AF65-F5344CB8AC3E}">
+        <p14:creationId xmlns:p14="http://schemas.microsoft.com/office/powerpoint/2010/main" val="2547834175"/>
+      </p:ext>
+    </p:extLst>
   </p:cSld>
   <p:clrMapOvr>
     <a:masterClrMapping/>
@@ -914,6 +950,11 @@
         </p:txBody>
       </p:sp>
     </p:spTree>
+    <p:extLst>
+      <p:ext uri="{BB962C8B-B14F-4D97-AF65-F5344CB8AC3E}">
+        <p14:creationId xmlns:p14="http://schemas.microsoft.com/office/powerpoint/2010/main" val="2780238445"/>
+      </p:ext>
+    </p:extLst>
   </p:cSld>
   <p:clrMapOvr>
     <a:masterClrMapping/>
@@ -1038,6 +1079,11 @@
         </p:txBody>
       </p:sp>
     </p:spTree>
+    <p:extLst>
+      <p:ext uri="{BB962C8B-B14F-4D97-AF65-F5344CB8AC3E}">
+        <p14:creationId xmlns:p14="http://schemas.microsoft.com/office/powerpoint/2010/main" val="3071680477"/>
+      </p:ext>
+    </p:extLst>
   </p:cSld>
   <p:clrMapOvr>
     <a:masterClrMapping/>
@@ -1192,6 +1238,11 @@
         </p:txBody>
       </p:sp>
     </p:spTree>
+    <p:extLst>
+      <p:ext uri="{BB962C8B-B14F-4D97-AF65-F5344CB8AC3E}">
+        <p14:creationId xmlns:p14="http://schemas.microsoft.com/office/powerpoint/2010/main" val="2086676137"/>
+      </p:ext>
+    </p:extLst>
   </p:cSld>
   <p:clrMapOvr>
     <a:masterClrMapping/>
@@ -1294,6 +1345,11 @@
         </p:txBody>
       </p:sp>
     </p:spTree>
+    <p:extLst>
+      <p:ext uri="{BB962C8B-B14F-4D97-AF65-F5344CB8AC3E}">
+        <p14:creationId xmlns:p14="http://schemas.microsoft.com/office/powerpoint/2010/main" val="4124408545"/>
+      </p:ext>
+    </p:extLst>
   </p:cSld>
   <p:clrMapOvr>
     <a:masterClrMapping/>
@@ -1393,6 +1449,11 @@
         </p:txBody>
       </p:sp>
     </p:spTree>
+    <p:extLst>
+      <p:ext uri="{BB962C8B-B14F-4D97-AF65-F5344CB8AC3E}">
+        <p14:creationId xmlns:p14="http://schemas.microsoft.com/office/powerpoint/2010/main" val="1540402122"/>
+      </p:ext>
+    </p:extLst>
   </p:cSld>
   <p:clrMapOvr>
     <a:masterClrMapping/>
@@ -1492,6 +1553,11 @@
         </p:txBody>
       </p:sp>
     </p:spTree>
+    <p:extLst>
+      <p:ext uri="{BB962C8B-B14F-4D97-AF65-F5344CB8AC3E}">
+        <p14:creationId xmlns:p14="http://schemas.microsoft.com/office/powerpoint/2010/main" val="3489840120"/>
+      </p:ext>
+    </p:extLst>
   </p:cSld>
   <p:clrMapOvr>
     <a:masterClrMapping/>
@@ -1613,6 +1679,11 @@
         </p:txBody>
       </p:sp>
     </p:spTree>
+    <p:extLst>
+      <p:ext uri="{BB962C8B-B14F-4D97-AF65-F5344CB8AC3E}">
+        <p14:creationId xmlns:p14="http://schemas.microsoft.com/office/powerpoint/2010/main" val="2385529362"/>
+      </p:ext>
+    </p:extLst>
   </p:cSld>
   <p:clrMapOvr>
     <a:masterClrMapping/>
@@ -1699,6 +1770,11 @@
         </p:txBody>
       </p:sp>
     </p:spTree>
+    <p:extLst>
+      <p:ext uri="{BB962C8B-B14F-4D97-AF65-F5344CB8AC3E}">
+        <p14:creationId xmlns:p14="http://schemas.microsoft.com/office/powerpoint/2010/main" val="28497300"/>
+      </p:ext>
+    </p:extLst>
   </p:cSld>
   <p:clrMapOvr>
     <a:masterClrMapping/>
@@ -1798,6 +1874,11 @@
         </p:txBody>
       </p:sp>
     </p:spTree>
+    <p:extLst>
+      <p:ext uri="{BB962C8B-B14F-4D97-AF65-F5344CB8AC3E}">
+        <p14:creationId xmlns:p14="http://schemas.microsoft.com/office/powerpoint/2010/main" val="556934836"/>
+      </p:ext>
+    </p:extLst>
   </p:cSld>
   <p:clrMapOvr>
     <a:masterClrMapping/>
@@ -1914,6 +1995,11 @@
         </p:txBody>
       </p:sp>
     </p:spTree>
+    <p:extLst>
+      <p:ext uri="{BB962C8B-B14F-4D97-AF65-F5344CB8AC3E}">
+        <p14:creationId xmlns:p14="http://schemas.microsoft.com/office/powerpoint/2010/main" val="2595173349"/>
+      </p:ext>
+    </p:extLst>
   </p:cSld>
   <p:clrMapOvr>
     <a:masterClrMapping/>
@@ -2013,6 +2099,11 @@
         </p:txBody>
       </p:sp>
     </p:spTree>
+    <p:extLst>
+      <p:ext uri="{BB962C8B-B14F-4D97-AF65-F5344CB8AC3E}">
+        <p14:creationId xmlns:p14="http://schemas.microsoft.com/office/powerpoint/2010/main" val="1701388315"/>
+      </p:ext>
+    </p:extLst>
   </p:cSld>
   <p:clrMapOvr>
     <a:masterClrMapping/>
@@ -2110,11 +2201,7 @@
           <a:p>
             <a:r>
               <a:rPr lang="en-US" dirty="0" smtClean="0"/>
-              <a:t>Pattern </a:t>
-            </a:r>
-            <a:r>
-              <a:rPr lang="en-US" dirty="0" smtClean="0"/>
-              <a:t>is only in user memory</a:t>
+              <a:t>Pattern is only in user memory</a:t>
             </a:r>
           </a:p>
           <a:p>
@@ -2241,6 +2328,11 @@
         </p:txBody>
       </p:sp>
     </p:spTree>
+    <p:extLst>
+      <p:ext uri="{BB962C8B-B14F-4D97-AF65-F5344CB8AC3E}">
+        <p14:creationId xmlns:p14="http://schemas.microsoft.com/office/powerpoint/2010/main" val="1028930757"/>
+      </p:ext>
+    </p:extLst>
   </p:cSld>
   <p:clrMapOvr>
     <a:masterClrMapping/>
@@ -2423,6 +2515,11 @@
         </p:txBody>
       </p:sp>
     </p:spTree>
+    <p:extLst>
+      <p:ext uri="{BB962C8B-B14F-4D97-AF65-F5344CB8AC3E}">
+        <p14:creationId xmlns:p14="http://schemas.microsoft.com/office/powerpoint/2010/main" val="2607433129"/>
+      </p:ext>
+    </p:extLst>
   </p:cSld>
   <p:clrMapOvr>
     <a:masterClrMapping/>
@@ -2513,6 +2610,11 @@
         </p:txBody>
       </p:sp>
     </p:spTree>
+    <p:extLst>
+      <p:ext uri="{BB962C8B-B14F-4D97-AF65-F5344CB8AC3E}">
+        <p14:creationId xmlns:p14="http://schemas.microsoft.com/office/powerpoint/2010/main" val="4237069767"/>
+      </p:ext>
+    </p:extLst>
   </p:cSld>
   <p:clrMapOvr>
     <a:masterClrMapping/>
@@ -2702,7 +2804,7 @@
             <a:fld id="{C7E7DF93-953C-4CE5-AD99-EE1FD8662BDD}" type="datetime1">
               <a:rPr lang="en-US" smtClean="0"/>
               <a:pPr/>
-              <a:t>12/6/2015</a:t>
+              <a:t>12/7/2015</a:t>
             </a:fld>
             <a:endParaRPr lang="en-US"/>
           </a:p>
@@ -2869,7 +2971,7 @@
             <a:fld id="{9F4AE335-72AC-4967-992A-932F28594567}" type="datetime1">
               <a:rPr lang="en-US" smtClean="0"/>
               <a:pPr/>
-              <a:t>12/6/2015</a:t>
+              <a:t>12/7/2015</a:t>
             </a:fld>
             <a:endParaRPr lang="en-US"/>
           </a:p>
@@ -3046,7 +3148,7 @@
             <a:fld id="{92BEECB2-3D6F-450C-B115-B7CCCFD45FFE}" type="datetime1">
               <a:rPr lang="en-US" smtClean="0"/>
               <a:pPr/>
-              <a:t>12/6/2015</a:t>
+              <a:t>12/7/2015</a:t>
             </a:fld>
             <a:endParaRPr lang="en-US"/>
           </a:p>
@@ -3213,7 +3315,7 @@
             <a:fld id="{90EE3A40-EF37-4171-8D45-C822B7A1A35E}" type="datetime1">
               <a:rPr lang="en-US" smtClean="0"/>
               <a:pPr/>
-              <a:t>12/6/2015</a:t>
+              <a:t>12/7/2015</a:t>
             </a:fld>
             <a:endParaRPr lang="en-US"/>
           </a:p>
@@ -3456,7 +3558,7 @@
             <a:fld id="{FE2632B6-BB53-4622-821E-EA2C0CB2050A}" type="datetime1">
               <a:rPr lang="en-US" smtClean="0"/>
               <a:pPr/>
-              <a:t>12/6/2015</a:t>
+              <a:t>12/7/2015</a:t>
             </a:fld>
             <a:endParaRPr lang="en-US"/>
           </a:p>
@@ -3741,7 +3843,7 @@
             <a:fld id="{C1C9520E-1D45-466C-AE12-E96EC4E629C3}" type="datetime1">
               <a:rPr lang="en-US" smtClean="0"/>
               <a:pPr/>
-              <a:t>12/6/2015</a:t>
+              <a:t>12/7/2015</a:t>
             </a:fld>
             <a:endParaRPr lang="en-US"/>
           </a:p>
@@ -4160,7 +4262,7 @@
             <a:fld id="{D6A8FC0F-D8A3-447D-9FD6-D475DBC8ECB9}" type="datetime1">
               <a:rPr lang="en-US" smtClean="0"/>
               <a:pPr/>
-              <a:t>12/6/2015</a:t>
+              <a:t>12/7/2015</a:t>
             </a:fld>
             <a:endParaRPr lang="en-US"/>
           </a:p>
@@ -4275,7 +4377,7 @@
             <a:fld id="{36996A84-20ED-4543-AD43-E2CF08CBB6C1}" type="datetime1">
               <a:rPr lang="en-US" smtClean="0"/>
               <a:pPr/>
-              <a:t>12/6/2015</a:t>
+              <a:t>12/7/2015</a:t>
             </a:fld>
             <a:endParaRPr lang="en-US"/>
           </a:p>
@@ -4367,7 +4469,7 @@
             <a:fld id="{6643B476-72B6-4844-A9C8-14D3E3ABC90B}" type="datetime1">
               <a:rPr lang="en-US" smtClean="0"/>
               <a:pPr/>
-              <a:t>12/6/2015</a:t>
+              <a:t>12/7/2015</a:t>
             </a:fld>
             <a:endParaRPr lang="en-US"/>
           </a:p>
@@ -4641,7 +4743,7 @@
             <a:fld id="{8E8EC741-C216-45D2-AD5B-207AF10B7971}" type="datetime1">
               <a:rPr lang="en-US" smtClean="0"/>
               <a:pPr/>
-              <a:t>12/6/2015</a:t>
+              <a:t>12/7/2015</a:t>
             </a:fld>
             <a:endParaRPr lang="en-US"/>
           </a:p>
@@ -4891,7 +4993,7 @@
             <a:fld id="{C15B8D67-E63E-4434-8C2C-54EDEB65D3B1}" type="datetime1">
               <a:rPr lang="en-US" smtClean="0"/>
               <a:pPr/>
-              <a:t>12/6/2015</a:t>
+              <a:t>12/7/2015</a:t>
             </a:fld>
             <a:endParaRPr lang="en-US"/>
           </a:p>
@@ -5101,7 +5203,7 @@
             <a:fld id="{D94947E5-0875-404F-A28B-016E40888269}" type="datetime1">
               <a:rPr lang="en-US" smtClean="0"/>
               <a:pPr/>
-              <a:t>12/6/2015</a:t>
+              <a:t>12/7/2015</a:t>
             </a:fld>
             <a:endParaRPr lang="en-US"/>
           </a:p>
@@ -5674,7 +5776,7 @@
       </p:sp>
       <p:pic>
         <p:nvPicPr>
-          <p:cNvPr id="4" name="Wildlife.wmv">
+          <p:cNvPr id="4" name="SecureCube_demo">
             <a:hlinkClick r:id="" action="ppaction://media"/>
           </p:cNvPr>
           <p:cNvPicPr>
@@ -5685,15 +5787,15 @@
           </p:nvPr>
         </p:nvPicPr>
         <p:blipFill>
-          <a:blip r:embed="rId4" cstate="print"/>
+          <a:blip r:embed="rId4"/>
           <a:stretch>
             <a:fillRect/>
           </a:stretch>
         </p:blipFill>
         <p:spPr>
           <a:xfrm>
-            <a:off x="794844" y="1280160"/>
-            <a:ext cx="7968156" cy="5120640"/>
+            <a:off x="457200" y="1063177"/>
+            <a:ext cx="8305800" cy="5337623"/>
           </a:xfrm>
           <a:prstGeom prst="rect">
             <a:avLst/>
@@ -12708,11 +12810,7 @@
           <a:p>
             <a:r>
               <a:rPr lang="en-US" dirty="0" smtClean="0"/>
-              <a:t>A</a:t>
-            </a:r>
-            <a:r>
-              <a:rPr lang="en-US" dirty="0" smtClean="0"/>
-              <a:t>ttacker has access to password</a:t>
+              <a:t>Attacker has access to password</a:t>
             </a:r>
           </a:p>
           <a:p>
@@ -12721,7 +12819,6 @@
               <a:rPr lang="en-US" dirty="0" smtClean="0"/>
               <a:t>Guessing/social engineering/phishing</a:t>
             </a:r>
-            <a:endParaRPr lang="en-US" dirty="0" smtClean="0"/>
           </a:p>
           <a:p>
             <a:endParaRPr lang="en-US" dirty="0" smtClean="0"/>
@@ -12736,22 +12833,14 @@
             <a:pPr lvl="1"/>
             <a:r>
               <a:rPr lang="en-US" dirty="0" smtClean="0"/>
-              <a:t>U</a:t>
-            </a:r>
+              <a:t>User’s phone</a:t>
+            </a:r>
+          </a:p>
+          <a:p>
+            <a:pPr lvl="1"/>
             <a:r>
               <a:rPr lang="en-US" dirty="0" smtClean="0"/>
-              <a:t>ser’s phone</a:t>
-            </a:r>
-          </a:p>
-          <a:p>
-            <a:pPr lvl="1"/>
-            <a:r>
-              <a:rPr lang="en-US" dirty="0" smtClean="0"/>
-              <a:t>S</a:t>
-            </a:r>
-            <a:r>
-              <a:rPr lang="en-US" dirty="0" smtClean="0"/>
-              <a:t>ynced laptop</a:t>
+              <a:t>Synced laptop</a:t>
             </a:r>
           </a:p>
           <a:p>
@@ -12768,33 +12857,15 @@
             </a:r>
             <a:r>
               <a:rPr lang="en-US" dirty="0" smtClean="0"/>
-              <a:t> </a:t>
-            </a:r>
+              <a:t> phone </a:t>
+            </a:r>
+          </a:p>
+          <a:p>
+            <a:pPr lvl="1"/>
             <a:r>
               <a:rPr lang="en-US" dirty="0" smtClean="0"/>
-              <a:t>phone </a:t>
-            </a:r>
-            <a:endParaRPr lang="en-US" dirty="0" smtClean="0"/>
-          </a:p>
-          <a:p>
-            <a:pPr lvl="1"/>
-            <a:r>
-              <a:rPr lang="en-US" dirty="0" smtClean="0"/>
-              <a:t>So c</a:t>
-            </a:r>
-            <a:r>
-              <a:rPr lang="en-US" dirty="0" smtClean="0"/>
-              <a:t>an </a:t>
-            </a:r>
-            <a:r>
-              <a:rPr lang="en-US" dirty="0" smtClean="0"/>
-              <a:t>try an offline-dictionary </a:t>
-            </a:r>
-            <a:r>
-              <a:rPr lang="en-US" dirty="0" smtClean="0"/>
-              <a:t>attack</a:t>
-            </a:r>
-            <a:endParaRPr lang="en-US" dirty="0" smtClean="0"/>
+              <a:t>So can try an offline-dictionary attack</a:t>
+            </a:r>
           </a:p>
         </p:txBody>
       </p:sp>
@@ -12894,22 +12965,9 @@
           </a:bodyPr>
           <a:lstStyle/>
           <a:p>
-            <a:r>
-              <a:rPr lang="en-US" dirty="0" smtClean="0">
-                <a:sym typeface="Wingdings" pitchFamily="2" charset="2"/>
-              </a:rPr>
-              <a:t>Server break-in </a:t>
-            </a:r>
-          </a:p>
-          <a:p>
-            <a:pPr lvl="1"/>
-            <a:r>
-              <a:rPr lang="en-US" dirty="0" smtClean="0"/>
-              <a:t>Hashed pattern is saved in server</a:t>
-            </a:r>
-          </a:p>
-          <a:p>
-            <a:pPr lvl="1"/>
+            <a:pPr marL="457200" lvl="1" indent="0">
+              <a:buNone/>
+            </a:pPr>
             <a:endParaRPr lang="en-US" sz="1400" dirty="0" smtClean="0"/>
           </a:p>
           <a:p>
@@ -12931,6 +12989,18 @@
           </a:p>
           <a:p>
             <a:pPr lvl="1"/>
+            <a:endParaRPr lang="en-US" sz="1800" dirty="0" smtClean="0"/>
+          </a:p>
+          <a:p>
+            <a:pPr marL="457200" lvl="1" indent="0">
+              <a:buNone/>
+            </a:pPr>
+            <a:endParaRPr lang="en-US" sz="1800" dirty="0"/>
+          </a:p>
+          <a:p>
+            <a:pPr marL="457200" lvl="1" indent="0">
+              <a:buNone/>
+            </a:pPr>
             <a:endParaRPr lang="en-US" sz="1800" dirty="0" smtClean="0"/>
           </a:p>
           <a:p>
@@ -13621,15 +13691,6 @@
             </a:r>
           </a:p>
           <a:p>
-            <a:pPr lvl="1"/>
-            <a:r>
-              <a:rPr lang="en-US" dirty="0" smtClean="0">
-                <a:sym typeface="Wingdings" pitchFamily="2" charset="2"/>
-              </a:rPr>
-              <a:t>Attacker needs to have a malicious app that present a pattern screen</a:t>
-            </a:r>
-          </a:p>
-          <a:p>
             <a:pPr lvl="1">
               <a:buNone/>
             </a:pPr>
@@ -13649,8 +13710,13 @@
             <a:pPr lvl="1"/>
             <a:r>
               <a:rPr lang="en-US" dirty="0" smtClean="0"/>
-              <a:t>Hijacking the screen while user enters pattern is harder</a:t>
-            </a:r>
+              <a:t>Hijacking the screen while user enters pattern is </a:t>
+            </a:r>
+            <a:r>
+              <a:rPr lang="en-US" dirty="0" smtClean="0"/>
+              <a:t>harder compared to reading an SMS. </a:t>
+            </a:r>
+            <a:endParaRPr lang="en-US" dirty="0" smtClean="0"/>
           </a:p>
           <a:p>
             <a:pPr lvl="1"/>

</xml_diff>